<commit_message>
Starting to write presentation
</commit_message>
<xml_diff>
--- a/BrainSway_Final_Presentation.pptx
+++ b/BrainSway_Final_Presentation.pptx
@@ -5,10 +5,10 @@
     <p:sldMasterId id="2147483708" r:id="rId1"/>
   </p:sldMasterIdLst>
   <p:notesMasterIdLst>
-    <p:notesMasterId r:id="rId41"/>
+    <p:notesMasterId r:id="rId43"/>
   </p:notesMasterIdLst>
   <p:handoutMasterIdLst>
-    <p:handoutMasterId r:id="rId42"/>
+    <p:handoutMasterId r:id="rId44"/>
   </p:handoutMasterIdLst>
   <p:sldIdLst>
     <p:sldId id="288" r:id="rId2"/>
@@ -50,6 +50,8 @@
     <p:sldId id="327" r:id="rId38"/>
     <p:sldId id="336" r:id="rId39"/>
     <p:sldId id="337" r:id="rId40"/>
+    <p:sldId id="338" r:id="rId41"/>
+    <p:sldId id="339" r:id="rId42"/>
   </p:sldIdLst>
   <p:sldSz cx="9144000" cy="6858000" type="screen4x3"/>
   <p:notesSz cx="7010400" cy="9296400"/>
@@ -360,7 +362,7 @@
             <a:fld id="{C9B6F397-9295-4C9F-B4B0-31BF9D08FE68}" type="datetimeFigureOut">
               <a:rPr lang="he-IL" smtClean="0"/>
               <a:pPr/>
-              <a:t>ט"ו/אייר/תשע"ח</a:t>
+              <a:t>י"ח/סיון/תשע"ח</a:t>
             </a:fld>
             <a:endParaRPr lang="he-IL"/>
           </a:p>
@@ -527,7 +529,7 @@
             <a:fld id="{543B7BDA-9DDC-4E4C-973D-E4A3E66645CD}" type="datetimeFigureOut">
               <a:rPr lang="he-IL" smtClean="0"/>
               <a:pPr/>
-              <a:t>י"ג/אייר/תשע"ח</a:t>
+              <a:t>י"ח/סיון/תשע"ח</a:t>
             </a:fld>
             <a:endParaRPr lang="he-IL"/>
           </a:p>
@@ -2365,7 +2367,7 @@
           <a:p>
             <a:fld id="{D7E1C0B7-AB0D-4AF9-9C80-529313F012B2}" type="datetime1">
               <a:rPr lang="en-US" smtClean="0"/>
-              <a:t>4/28/2018</a:t>
+              <a:t>6/1/2018</a:t>
             </a:fld>
             <a:endParaRPr lang="en-US"/>
           </a:p>
@@ -2609,7 +2611,7 @@
           <a:p>
             <a:fld id="{2A982F35-29BF-4127-A4F3-CE8B20D358F7}" type="datetime1">
               <a:rPr lang="en-US" smtClean="0"/>
-              <a:t>4/28/2018</a:t>
+              <a:t>6/1/2018</a:t>
             </a:fld>
             <a:endParaRPr lang="en-US"/>
           </a:p>
@@ -20724,8 +20726,8 @@
           </a:p>
         </p:txBody>
       </p:sp>
-      <mc:AlternateContent xmlns:mc="http://schemas.openxmlformats.org/markup-compatibility/2006">
-        <mc:Choice xmlns:a14="http://schemas.microsoft.com/office/drawing/2010/main" Requires="a14">
+      <mc:AlternateContent xmlns:mc="http://schemas.openxmlformats.org/markup-compatibility/2006" xmlns:a14="http://schemas.microsoft.com/office/drawing/2010/main">
+        <mc:Choice Requires="a14">
           <p:sp>
             <p:nvSpPr>
               <p:cNvPr id="3" name="Content Placeholder 2">
@@ -21014,7 +21016,7 @@
             </p:txBody>
           </p:sp>
         </mc:Choice>
-        <mc:Fallback>
+        <mc:Fallback xmlns="">
           <p:sp>
             <p:nvSpPr>
               <p:cNvPr id="3" name="Content Placeholder 2">
@@ -21693,8 +21695,8 @@
           </a:p>
         </p:txBody>
       </p:sp>
-      <mc:AlternateContent xmlns:mc="http://schemas.openxmlformats.org/markup-compatibility/2006">
-        <mc:Choice xmlns:a14="http://schemas.microsoft.com/office/drawing/2010/main" Requires="a14">
+      <mc:AlternateContent xmlns:mc="http://schemas.openxmlformats.org/markup-compatibility/2006" xmlns:a14="http://schemas.microsoft.com/office/drawing/2010/main">
+        <mc:Choice Requires="a14">
           <p:sp>
             <p:nvSpPr>
               <p:cNvPr id="3" name="Content Placeholder 2">
@@ -21911,7 +21913,7 @@
             </p:txBody>
           </p:sp>
         </mc:Choice>
-        <mc:Fallback>
+        <mc:Fallback xmlns="">
           <p:sp>
             <p:nvSpPr>
               <p:cNvPr id="3" name="Content Placeholder 2">
@@ -22491,8 +22493,8 @@
           </a:p>
         </p:txBody>
       </p:sp>
-      <mc:AlternateContent xmlns:mc="http://schemas.openxmlformats.org/markup-compatibility/2006">
-        <mc:Choice xmlns:a14="http://schemas.microsoft.com/office/drawing/2010/main" Requires="a14">
+      <mc:AlternateContent xmlns:mc="http://schemas.openxmlformats.org/markup-compatibility/2006" xmlns:a14="http://schemas.microsoft.com/office/drawing/2010/main">
+        <mc:Choice Requires="a14">
           <p:sp>
             <p:nvSpPr>
               <p:cNvPr id="3" name="Content Placeholder 2">
@@ -22614,7 +22616,7 @@
             </p:txBody>
           </p:sp>
         </mc:Choice>
-        <mc:Fallback>
+        <mc:Fallback xmlns="">
           <p:sp>
             <p:nvSpPr>
               <p:cNvPr id="3" name="Content Placeholder 2">
@@ -22897,8 +22899,8 @@
           </a:p>
         </p:txBody>
       </p:sp>
-      <mc:AlternateContent xmlns:mc="http://schemas.openxmlformats.org/markup-compatibility/2006">
-        <mc:Choice xmlns:a14="http://schemas.microsoft.com/office/drawing/2010/main" Requires="a14">
+      <mc:AlternateContent xmlns:mc="http://schemas.openxmlformats.org/markup-compatibility/2006" xmlns:a14="http://schemas.microsoft.com/office/drawing/2010/main">
+        <mc:Choice Requires="a14">
           <p:sp>
             <p:nvSpPr>
               <p:cNvPr id="3" name="Content Placeholder 2">
@@ -23011,7 +23013,7 @@
             </p:txBody>
           </p:sp>
         </mc:Choice>
-        <mc:Fallback>
+        <mc:Fallback xmlns="">
           <p:sp>
             <p:nvSpPr>
               <p:cNvPr id="3" name="Content Placeholder 2">
@@ -23847,6 +23849,258 @@
       <p:bldP spid="3" grpId="0" build="p"/>
     </p:bldLst>
   </p:timing>
+</p:sld>
+</file>
+
+<file path=ppt/slides/slide40.xml><?xml version="1.0" encoding="utf-8"?>
+<p:sld xmlns:a="http://schemas.openxmlformats.org/drawingml/2006/main" xmlns:r="http://schemas.openxmlformats.org/officeDocument/2006/relationships" xmlns:p="http://schemas.openxmlformats.org/presentationml/2006/main">
+  <p:cSld>
+    <p:spTree>
+      <p:nvGrpSpPr>
+        <p:cNvPr id="1" name=""/>
+        <p:cNvGrpSpPr/>
+        <p:nvPr/>
+      </p:nvGrpSpPr>
+      <p:grpSpPr>
+        <a:xfrm>
+          <a:off x="0" y="0"/>
+          <a:ext cx="0" cy="0"/>
+          <a:chOff x="0" y="0"/>
+          <a:chExt cx="0" cy="0"/>
+        </a:xfrm>
+      </p:grpSpPr>
+      <p:sp>
+        <p:nvSpPr>
+          <p:cNvPr id="2" name="Title 1">
+            <a:extLst>
+              <a:ext uri="{FF2B5EF4-FFF2-40B4-BE49-F238E27FC236}">
+                <a16:creationId xmlns:a16="http://schemas.microsoft.com/office/drawing/2014/main" id="{405DCAC0-EFC8-4FCE-B34E-A70006248E65}"/>
+              </a:ext>
+            </a:extLst>
+          </p:cNvPr>
+          <p:cNvSpPr>
+            <a:spLocks noGrp="1"/>
+          </p:cNvSpPr>
+          <p:nvPr>
+            <p:ph type="title"/>
+          </p:nvPr>
+        </p:nvSpPr>
+        <p:spPr/>
+        <p:txBody>
+          <a:bodyPr/>
+          <a:lstStyle/>
+          <a:p>
+            <a:r>
+              <a:rPr lang="en-US" dirty="0"/>
+              <a:t>Parallel Transport</a:t>
+            </a:r>
+            <a:endParaRPr lang="en-IL" dirty="0"/>
+          </a:p>
+        </p:txBody>
+      </p:sp>
+      <p:sp>
+        <p:nvSpPr>
+          <p:cNvPr id="3" name="Content Placeholder 2">
+            <a:extLst>
+              <a:ext uri="{FF2B5EF4-FFF2-40B4-BE49-F238E27FC236}">
+                <a16:creationId xmlns:a16="http://schemas.microsoft.com/office/drawing/2014/main" id="{C1D667D5-7FCA-40C4-ABA4-E428734E130A}"/>
+              </a:ext>
+            </a:extLst>
+          </p:cNvPr>
+          <p:cNvSpPr>
+            <a:spLocks noGrp="1"/>
+          </p:cNvSpPr>
+          <p:nvPr>
+            <p:ph idx="1"/>
+          </p:nvPr>
+        </p:nvSpPr>
+        <p:spPr/>
+        <p:txBody>
+          <a:bodyPr/>
+          <a:lstStyle/>
+          <a:p>
+            <a:r>
+              <a:rPr lang="en-US" dirty="0"/>
+              <a:t>Previous research on similar problems revealed large differences in behavior of different subjects</a:t>
+            </a:r>
+          </a:p>
+          <a:p>
+            <a:r>
+              <a:rPr lang="en-US" dirty="0"/>
+              <a:t>This was solved by using a parallel transport algorithm, to account for these differences</a:t>
+            </a:r>
+          </a:p>
+          <a:p>
+            <a:r>
+              <a:rPr lang="en-US" dirty="0"/>
+              <a:t>We attempted a similar approach on our data, aiming to find possible patterns</a:t>
+            </a:r>
+            <a:endParaRPr lang="en-IL" dirty="0"/>
+          </a:p>
+        </p:txBody>
+      </p:sp>
+      <p:sp>
+        <p:nvSpPr>
+          <p:cNvPr id="4" name="Slide Number Placeholder 3">
+            <a:extLst>
+              <a:ext uri="{FF2B5EF4-FFF2-40B4-BE49-F238E27FC236}">
+                <a16:creationId xmlns:a16="http://schemas.microsoft.com/office/drawing/2014/main" id="{F0CA276A-74D4-4868-A934-8C69C5960D40}"/>
+              </a:ext>
+            </a:extLst>
+          </p:cNvPr>
+          <p:cNvSpPr>
+            <a:spLocks noGrp="1"/>
+          </p:cNvSpPr>
+          <p:nvPr>
+            <p:ph type="sldNum" sz="quarter" idx="12"/>
+          </p:nvPr>
+        </p:nvSpPr>
+        <p:spPr/>
+        <p:txBody>
+          <a:bodyPr/>
+          <a:lstStyle/>
+          <a:p>
+            <a:fld id="{B01D9778-10B4-40FB-B4E4-44FA89A86639}" type="slidenum">
+              <a:rPr lang="en-US" smtClean="0"/>
+              <a:pPr/>
+              <a:t>40</a:t>
+            </a:fld>
+            <a:endParaRPr lang="en-US"/>
+          </a:p>
+        </p:txBody>
+      </p:sp>
+    </p:spTree>
+    <p:extLst>
+      <p:ext uri="{BB962C8B-B14F-4D97-AF65-F5344CB8AC3E}">
+        <p14:creationId xmlns:p14="http://schemas.microsoft.com/office/powerpoint/2010/main" val="3075857220"/>
+      </p:ext>
+    </p:extLst>
+  </p:cSld>
+  <p:clrMapOvr>
+    <a:masterClrMapping/>
+  </p:clrMapOvr>
+</p:sld>
+</file>
+
+<file path=ppt/slides/slide41.xml><?xml version="1.0" encoding="utf-8"?>
+<p:sld xmlns:a="http://schemas.openxmlformats.org/drawingml/2006/main" xmlns:r="http://schemas.openxmlformats.org/officeDocument/2006/relationships" xmlns:p="http://schemas.openxmlformats.org/presentationml/2006/main">
+  <p:cSld>
+    <p:spTree>
+      <p:nvGrpSpPr>
+        <p:cNvPr id="1" name=""/>
+        <p:cNvGrpSpPr/>
+        <p:nvPr/>
+      </p:nvGrpSpPr>
+      <p:grpSpPr>
+        <a:xfrm>
+          <a:off x="0" y="0"/>
+          <a:ext cx="0" cy="0"/>
+          <a:chOff x="0" y="0"/>
+          <a:chExt cx="0" cy="0"/>
+        </a:xfrm>
+      </p:grpSpPr>
+      <p:sp>
+        <p:nvSpPr>
+          <p:cNvPr id="2" name="Title 1">
+            <a:extLst>
+              <a:ext uri="{FF2B5EF4-FFF2-40B4-BE49-F238E27FC236}">
+                <a16:creationId xmlns:a16="http://schemas.microsoft.com/office/drawing/2014/main" id="{405DCAC0-EFC8-4FCE-B34E-A70006248E65}"/>
+              </a:ext>
+            </a:extLst>
+          </p:cNvPr>
+          <p:cNvSpPr>
+            <a:spLocks noGrp="1"/>
+          </p:cNvSpPr>
+          <p:nvPr>
+            <p:ph type="title"/>
+          </p:nvPr>
+        </p:nvSpPr>
+        <p:spPr/>
+        <p:txBody>
+          <a:bodyPr/>
+          <a:lstStyle/>
+          <a:p>
+            <a:r>
+              <a:rPr lang="en-US" dirty="0"/>
+              <a:t>Parallel Transport</a:t>
+            </a:r>
+            <a:endParaRPr lang="en-IL" dirty="0"/>
+          </a:p>
+        </p:txBody>
+      </p:sp>
+      <p:sp>
+        <p:nvSpPr>
+          <p:cNvPr id="3" name="Content Placeholder 2">
+            <a:extLst>
+              <a:ext uri="{FF2B5EF4-FFF2-40B4-BE49-F238E27FC236}">
+                <a16:creationId xmlns:a16="http://schemas.microsoft.com/office/drawing/2014/main" id="{C1D667D5-7FCA-40C4-ABA4-E428734E130A}"/>
+              </a:ext>
+            </a:extLst>
+          </p:cNvPr>
+          <p:cNvSpPr>
+            <a:spLocks noGrp="1"/>
+          </p:cNvSpPr>
+          <p:nvPr>
+            <p:ph idx="1"/>
+          </p:nvPr>
+        </p:nvSpPr>
+        <p:spPr/>
+        <p:txBody>
+          <a:bodyPr/>
+          <a:lstStyle/>
+          <a:p>
+            <a:r>
+              <a:rPr lang="en-US" dirty="0"/>
+              <a:t>Covariance was used </a:t>
+            </a:r>
+            <a:r>
+              <a:rPr lang="en-US"/>
+              <a:t>as features, </a:t>
+            </a:r>
+            <a:endParaRPr lang="en-IL" dirty="0"/>
+          </a:p>
+        </p:txBody>
+      </p:sp>
+      <p:sp>
+        <p:nvSpPr>
+          <p:cNvPr id="4" name="Slide Number Placeholder 3">
+            <a:extLst>
+              <a:ext uri="{FF2B5EF4-FFF2-40B4-BE49-F238E27FC236}">
+                <a16:creationId xmlns:a16="http://schemas.microsoft.com/office/drawing/2014/main" id="{F0CA276A-74D4-4868-A934-8C69C5960D40}"/>
+              </a:ext>
+            </a:extLst>
+          </p:cNvPr>
+          <p:cNvSpPr>
+            <a:spLocks noGrp="1"/>
+          </p:cNvSpPr>
+          <p:nvPr>
+            <p:ph type="sldNum" sz="quarter" idx="12"/>
+          </p:nvPr>
+        </p:nvSpPr>
+        <p:spPr/>
+        <p:txBody>
+          <a:bodyPr/>
+          <a:lstStyle/>
+          <a:p>
+            <a:fld id="{B01D9778-10B4-40FB-B4E4-44FA89A86639}" type="slidenum">
+              <a:rPr lang="en-US" smtClean="0"/>
+              <a:pPr/>
+              <a:t>41</a:t>
+            </a:fld>
+            <a:endParaRPr lang="en-US"/>
+          </a:p>
+        </p:txBody>
+      </p:sp>
+    </p:spTree>
+    <p:extLst>
+      <p:ext uri="{BB962C8B-B14F-4D97-AF65-F5344CB8AC3E}">
+        <p14:creationId xmlns:p14="http://schemas.microsoft.com/office/powerpoint/2010/main" val="2065357033"/>
+      </p:ext>
+    </p:extLst>
+  </p:cSld>
+  <p:clrMapOvr>
+    <a:masterClrMapping/>
+  </p:clrMapOvr>
 </p:sld>
 </file>
 

</xml_diff>